<commit_message>
change test to use Calibri instead of Cambria
because of the Caladea problem

There are sadly now two Caladea fonts with different metrics, see:
 https://bugzilla.redhat.com/show_bug.cgi?id=2162532
 https://github.com/huertatipografica/Caladea/issues/4

Change-Id: I7080d16ec8aae2bbe60717aea85b980a33340e9b
Reviewed-on: https://gerrit.libreoffice.org/c/core/+/145830
Tested-by: Jenkins
Reviewed-by: Caolán McNamara <caolanm@redhat.com>
</commit_message>
<xml_diff>
--- a/sd/qa/unit/data/pptx/tdf125573_FontWorkScaleX.pptx
+++ b/sd/qa/unit/data/pptx/tdf125573_FontWorkScaleX.pptx
@@ -2429,8 +2429,8 @@
                   </a:gsLst>
                   <a:lin ang="5400000" scaled="1"/>
                 </a:gradFill>
-                <a:latin typeface="Cambria" panose="02040503050406030204" pitchFamily="18" charset="0"/>
-                <a:ea typeface="Cambria" panose="02040503050406030204" pitchFamily="18" charset="0"/>
+                <a:latin typeface="Calibri" panose="02040503050406030204" pitchFamily="18" charset="0"/>
+                <a:ea typeface="Calibri" panose="02040503050406030204" pitchFamily="18" charset="0"/>
               </a:rPr>
               <a:t>This is a long, long first line.</a:t>
             </a:r>
@@ -2457,8 +2457,8 @@
                   </a:gsLst>
                   <a:lin ang="5400000" scaled="1"/>
                 </a:gradFill>
-                <a:latin typeface="Cambria" panose="02040503050406030204" pitchFamily="18" charset="0"/>
-                <a:ea typeface="Cambria" panose="02040503050406030204" pitchFamily="18" charset="0"/>
+                <a:latin typeface="Calibri" panose="02040503050406030204" pitchFamily="18" charset="0"/>
+                <a:ea typeface="Calibri" panose="02040503050406030204" pitchFamily="18" charset="0"/>
               </a:rPr>
               <a:t>Second line short</a:t>
             </a:r>

</xml_diff>